<commit_message>
Finalizada gestión usuarios, inicidad consulta tickets
</commit_message>
<xml_diff>
--- a/doc/Prototipos.pptx
+++ b/doc/Prototipos.pptx
@@ -9,6 +9,7 @@
     <p:sldId id="257" r:id="rId3"/>
     <p:sldId id="258" r:id="rId4"/>
     <p:sldId id="259" r:id="rId5"/>
+    <p:sldId id="260" r:id="rId6"/>
   </p:sldIdLst>
   <p:sldSz cx="12192000" cy="6858000"/>
   <p:notesSz cx="6858000" cy="9144000"/>
@@ -264,7 +265,7 @@
           <a:p>
             <a:fld id="{BD943E62-1F80-4B59-B982-238B1957610A}" type="datetimeFigureOut">
               <a:rPr lang="en-GB" smtClean="0"/>
-              <a:t>02/05/2022</a:t>
+              <a:t>05/05/2022</a:t>
             </a:fld>
             <a:endParaRPr lang="en-GB"/>
           </a:p>
@@ -464,7 +465,7 @@
           <a:p>
             <a:fld id="{BD943E62-1F80-4B59-B982-238B1957610A}" type="datetimeFigureOut">
               <a:rPr lang="en-GB" smtClean="0"/>
-              <a:t>02/05/2022</a:t>
+              <a:t>05/05/2022</a:t>
             </a:fld>
             <a:endParaRPr lang="en-GB"/>
           </a:p>
@@ -674,7 +675,7 @@
           <a:p>
             <a:fld id="{BD943E62-1F80-4B59-B982-238B1957610A}" type="datetimeFigureOut">
               <a:rPr lang="en-GB" smtClean="0"/>
-              <a:t>02/05/2022</a:t>
+              <a:t>05/05/2022</a:t>
             </a:fld>
             <a:endParaRPr lang="en-GB"/>
           </a:p>
@@ -874,7 +875,7 @@
           <a:p>
             <a:fld id="{BD943E62-1F80-4B59-B982-238B1957610A}" type="datetimeFigureOut">
               <a:rPr lang="en-GB" smtClean="0"/>
-              <a:t>02/05/2022</a:t>
+              <a:t>05/05/2022</a:t>
             </a:fld>
             <a:endParaRPr lang="en-GB"/>
           </a:p>
@@ -1150,7 +1151,7 @@
           <a:p>
             <a:fld id="{BD943E62-1F80-4B59-B982-238B1957610A}" type="datetimeFigureOut">
               <a:rPr lang="en-GB" smtClean="0"/>
-              <a:t>02/05/2022</a:t>
+              <a:t>05/05/2022</a:t>
             </a:fld>
             <a:endParaRPr lang="en-GB"/>
           </a:p>
@@ -1418,7 +1419,7 @@
           <a:p>
             <a:fld id="{BD943E62-1F80-4B59-B982-238B1957610A}" type="datetimeFigureOut">
               <a:rPr lang="en-GB" smtClean="0"/>
-              <a:t>02/05/2022</a:t>
+              <a:t>05/05/2022</a:t>
             </a:fld>
             <a:endParaRPr lang="en-GB"/>
           </a:p>
@@ -1833,7 +1834,7 @@
           <a:p>
             <a:fld id="{BD943E62-1F80-4B59-B982-238B1957610A}" type="datetimeFigureOut">
               <a:rPr lang="en-GB" smtClean="0"/>
-              <a:t>02/05/2022</a:t>
+              <a:t>05/05/2022</a:t>
             </a:fld>
             <a:endParaRPr lang="en-GB"/>
           </a:p>
@@ -1975,7 +1976,7 @@
           <a:p>
             <a:fld id="{BD943E62-1F80-4B59-B982-238B1957610A}" type="datetimeFigureOut">
               <a:rPr lang="en-GB" smtClean="0"/>
-              <a:t>02/05/2022</a:t>
+              <a:t>05/05/2022</a:t>
             </a:fld>
             <a:endParaRPr lang="en-GB"/>
           </a:p>
@@ -2088,7 +2089,7 @@
           <a:p>
             <a:fld id="{BD943E62-1F80-4B59-B982-238B1957610A}" type="datetimeFigureOut">
               <a:rPr lang="en-GB" smtClean="0"/>
-              <a:t>02/05/2022</a:t>
+              <a:t>05/05/2022</a:t>
             </a:fld>
             <a:endParaRPr lang="en-GB"/>
           </a:p>
@@ -2401,7 +2402,7 @@
           <a:p>
             <a:fld id="{BD943E62-1F80-4B59-B982-238B1957610A}" type="datetimeFigureOut">
               <a:rPr lang="en-GB" smtClean="0"/>
-              <a:t>02/05/2022</a:t>
+              <a:t>05/05/2022</a:t>
             </a:fld>
             <a:endParaRPr lang="en-GB"/>
           </a:p>
@@ -2690,7 +2691,7 @@
           <a:p>
             <a:fld id="{BD943E62-1F80-4B59-B982-238B1957610A}" type="datetimeFigureOut">
               <a:rPr lang="en-GB" smtClean="0"/>
-              <a:t>02/05/2022</a:t>
+              <a:t>05/05/2022</a:t>
             </a:fld>
             <a:endParaRPr lang="en-GB"/>
           </a:p>
@@ -2933,7 +2934,7 @@
           <a:p>
             <a:fld id="{BD943E62-1F80-4B59-B982-238B1957610A}" type="datetimeFigureOut">
               <a:rPr lang="en-GB" smtClean="0"/>
-              <a:t>02/05/2022</a:t>
+              <a:t>05/05/2022</a:t>
             </a:fld>
             <a:endParaRPr lang="en-GB"/>
           </a:p>
@@ -7184,6 +7185,1275 @@
 </p:sld>
 </file>
 
+<file path=ppt/slides/slide5.xml><?xml version="1.0" encoding="utf-8"?>
+<p:sld xmlns:a="http://schemas.openxmlformats.org/drawingml/2006/main" xmlns:r="http://schemas.openxmlformats.org/officeDocument/2006/relationships" xmlns:p="http://schemas.openxmlformats.org/presentationml/2006/main">
+  <p:cSld>
+    <p:spTree>
+      <p:nvGrpSpPr>
+        <p:cNvPr id="1" name=""/>
+        <p:cNvGrpSpPr/>
+        <p:nvPr/>
+      </p:nvGrpSpPr>
+      <p:grpSpPr>
+        <a:xfrm>
+          <a:off x="0" y="0"/>
+          <a:ext cx="0" cy="0"/>
+          <a:chOff x="0" y="0"/>
+          <a:chExt cx="0" cy="0"/>
+        </a:xfrm>
+      </p:grpSpPr>
+      <p:sp>
+        <p:nvSpPr>
+          <p:cNvPr id="4" name="Rectángulo 3">
+            <a:extLst>
+              <a:ext uri="{FF2B5EF4-FFF2-40B4-BE49-F238E27FC236}">
+                <a16:creationId xmlns:a16="http://schemas.microsoft.com/office/drawing/2014/main" id="{98C3EA07-E93B-440E-9D2C-12E9BB4171B6}"/>
+              </a:ext>
+            </a:extLst>
+          </p:cNvPr>
+          <p:cNvSpPr/>
+          <p:nvPr/>
+        </p:nvSpPr>
+        <p:spPr>
+          <a:xfrm>
+            <a:off x="267892" y="391099"/>
+            <a:ext cx="5141319" cy="3037901"/>
+          </a:xfrm>
+          <a:prstGeom prst="rect">
+            <a:avLst/>
+          </a:prstGeom>
+        </p:spPr>
+        <p:style>
+          <a:lnRef idx="1">
+            <a:schemeClr val="accent5"/>
+          </a:lnRef>
+          <a:fillRef idx="2">
+            <a:schemeClr val="accent5"/>
+          </a:fillRef>
+          <a:effectRef idx="1">
+            <a:schemeClr val="accent5"/>
+          </a:effectRef>
+          <a:fontRef idx="minor">
+            <a:schemeClr val="dk1"/>
+          </a:fontRef>
+        </p:style>
+        <p:txBody>
+          <a:bodyPr rtlCol="0" anchor="ctr"/>
+          <a:lstStyle/>
+          <a:p>
+            <a:pPr algn="ctr"/>
+            <a:endParaRPr lang="en-GB"/>
+          </a:p>
+        </p:txBody>
+      </p:sp>
+      <p:graphicFrame>
+        <p:nvGraphicFramePr>
+          <p:cNvPr id="5" name="Tabla 11">
+            <a:extLst>
+              <a:ext uri="{FF2B5EF4-FFF2-40B4-BE49-F238E27FC236}">
+                <a16:creationId xmlns:a16="http://schemas.microsoft.com/office/drawing/2014/main" id="{08E01BA3-A754-42FF-BEC7-02D41CAB0B3B}"/>
+              </a:ext>
+            </a:extLst>
+          </p:cNvPr>
+          <p:cNvGraphicFramePr>
+            <a:graphicFrameLocks noGrp="1"/>
+          </p:cNvGraphicFramePr>
+          <p:nvPr>
+            <p:extLst>
+              <p:ext uri="{D42A27DB-BD31-4B8C-83A1-F6EECF244321}">
+                <p14:modId xmlns:p14="http://schemas.microsoft.com/office/powerpoint/2010/main" val="3865686509"/>
+              </p:ext>
+            </p:extLst>
+          </p:nvPr>
+        </p:nvGraphicFramePr>
+        <p:xfrm>
+          <a:off x="267893" y="435631"/>
+          <a:ext cx="5141320" cy="2489958"/>
+        </p:xfrm>
+        <a:graphic>
+          <a:graphicData uri="http://schemas.openxmlformats.org/drawingml/2006/table">
+            <a:tbl>
+              <a:tblPr firstRow="1" bandRow="1">
+                <a:tableStyleId>{5C22544A-7EE6-4342-B048-85BDC9FD1C3A}</a:tableStyleId>
+              </a:tblPr>
+              <a:tblGrid>
+                <a:gridCol w="984954">
+                  <a:extLst>
+                    <a:ext uri="{9D8B030D-6E8A-4147-A177-3AD203B41FA5}">
+                      <a16:colId xmlns:a16="http://schemas.microsoft.com/office/drawing/2014/main" val="249871207"/>
+                    </a:ext>
+                  </a:extLst>
+                </a:gridCol>
+                <a:gridCol w="1395350">
+                  <a:extLst>
+                    <a:ext uri="{9D8B030D-6E8A-4147-A177-3AD203B41FA5}">
+                      <a16:colId xmlns:a16="http://schemas.microsoft.com/office/drawing/2014/main" val="4226096560"/>
+                    </a:ext>
+                  </a:extLst>
+                </a:gridCol>
+                <a:gridCol w="2090058">
+                  <a:extLst>
+                    <a:ext uri="{9D8B030D-6E8A-4147-A177-3AD203B41FA5}">
+                      <a16:colId xmlns:a16="http://schemas.microsoft.com/office/drawing/2014/main" val="3295134188"/>
+                    </a:ext>
+                  </a:extLst>
+                </a:gridCol>
+                <a:gridCol w="670958">
+                  <a:extLst>
+                    <a:ext uri="{9D8B030D-6E8A-4147-A177-3AD203B41FA5}">
+                      <a16:colId xmlns:a16="http://schemas.microsoft.com/office/drawing/2014/main" val="3832300697"/>
+                    </a:ext>
+                  </a:extLst>
+                </a:gridCol>
+              </a:tblGrid>
+              <a:tr h="354033">
+                <a:tc>
+                  <a:txBody>
+                    <a:bodyPr/>
+                    <a:lstStyle/>
+                    <a:p>
+                      <a:endParaRPr lang="en-GB"/>
+                    </a:p>
+                  </a:txBody>
+                  <a:tcPr/>
+                </a:tc>
+                <a:tc>
+                  <a:txBody>
+                    <a:bodyPr/>
+                    <a:lstStyle/>
+                    <a:p>
+                      <a:endParaRPr lang="en-GB"/>
+                    </a:p>
+                  </a:txBody>
+                  <a:tcPr/>
+                </a:tc>
+                <a:tc>
+                  <a:txBody>
+                    <a:bodyPr/>
+                    <a:lstStyle/>
+                    <a:p>
+                      <a:endParaRPr lang="en-GB" dirty="0"/>
+                    </a:p>
+                  </a:txBody>
+                  <a:tcPr/>
+                </a:tc>
+                <a:tc>
+                  <a:txBody>
+                    <a:bodyPr/>
+                    <a:lstStyle/>
+                    <a:p>
+                      <a:endParaRPr lang="en-GB"/>
+                    </a:p>
+                  </a:txBody>
+                  <a:tcPr/>
+                </a:tc>
+                <a:extLst>
+                  <a:ext uri="{0D108BD9-81ED-4DB2-BD59-A6C34878D82A}">
+                    <a16:rowId xmlns:a16="http://schemas.microsoft.com/office/drawing/2014/main" val="2539864078"/>
+                  </a:ext>
+                </a:extLst>
+              </a:tr>
+              <a:tr h="354033">
+                <a:tc>
+                  <a:txBody>
+                    <a:bodyPr/>
+                    <a:lstStyle/>
+                    <a:p>
+                      <a:r>
+                        <a:rPr lang="es-ES" sz="1400" dirty="0"/>
+                        <a:t>VICTORGV</a:t>
+                      </a:r>
+                      <a:endParaRPr lang="en-GB" sz="1400" dirty="0"/>
+                    </a:p>
+                  </a:txBody>
+                  <a:tcPr/>
+                </a:tc>
+                <a:tc>
+                  <a:txBody>
+                    <a:bodyPr/>
+                    <a:lstStyle/>
+                    <a:p>
+                      <a:r>
+                        <a:rPr lang="es-ES" sz="1400" dirty="0"/>
+                        <a:t>Victor Garcia</a:t>
+                      </a:r>
+                      <a:endParaRPr lang="en-GB" sz="1400" dirty="0"/>
+                    </a:p>
+                  </a:txBody>
+                  <a:tcPr/>
+                </a:tc>
+                <a:tc>
+                  <a:txBody>
+                    <a:bodyPr/>
+                    <a:lstStyle/>
+                    <a:p>
+                      <a:r>
+                        <a:rPr lang="es-ES" sz="1400" dirty="0"/>
+                        <a:t>victorgv00@gmail.com</a:t>
+                      </a:r>
+                      <a:endParaRPr lang="en-GB" sz="1400" dirty="0"/>
+                    </a:p>
+                  </a:txBody>
+                  <a:tcPr/>
+                </a:tc>
+                <a:tc>
+                  <a:txBody>
+                    <a:bodyPr/>
+                    <a:lstStyle/>
+                    <a:p>
+                      <a:r>
+                        <a:rPr lang="es-ES" sz="1400" dirty="0" err="1"/>
+                        <a:t>Admin</a:t>
+                      </a:r>
+                      <a:endParaRPr lang="en-GB" sz="1400" dirty="0"/>
+                    </a:p>
+                  </a:txBody>
+                  <a:tcPr/>
+                </a:tc>
+                <a:extLst>
+                  <a:ext uri="{0D108BD9-81ED-4DB2-BD59-A6C34878D82A}">
+                    <a16:rowId xmlns:a16="http://schemas.microsoft.com/office/drawing/2014/main" val="2594829336"/>
+                  </a:ext>
+                </a:extLst>
+              </a:tr>
+              <a:tr h="354033">
+                <a:tc>
+                  <a:txBody>
+                    <a:bodyPr/>
+                    <a:lstStyle/>
+                    <a:p>
+                      <a:r>
+                        <a:rPr lang="es-ES" sz="1400" dirty="0"/>
+                        <a:t>MARIA</a:t>
+                      </a:r>
+                      <a:endParaRPr lang="en-GB" sz="1400" dirty="0"/>
+                    </a:p>
+                  </a:txBody>
+                  <a:tcPr/>
+                </a:tc>
+                <a:tc>
+                  <a:txBody>
+                    <a:bodyPr/>
+                    <a:lstStyle/>
+                    <a:p>
+                      <a:r>
+                        <a:rPr lang="es-ES" sz="1400" dirty="0"/>
+                        <a:t>Maria Sanchez</a:t>
+                      </a:r>
+                      <a:endParaRPr lang="en-GB" sz="1400" dirty="0"/>
+                    </a:p>
+                  </a:txBody>
+                  <a:tcPr/>
+                </a:tc>
+                <a:tc>
+                  <a:txBody>
+                    <a:bodyPr/>
+                    <a:lstStyle/>
+                    <a:p>
+                      <a:r>
+                        <a:rPr lang="es-ES" sz="1400" dirty="0"/>
+                        <a:t>msanchez@gmail.com</a:t>
+                      </a:r>
+                      <a:endParaRPr lang="en-GB" sz="1400" dirty="0"/>
+                    </a:p>
+                  </a:txBody>
+                  <a:tcPr/>
+                </a:tc>
+                <a:tc>
+                  <a:txBody>
+                    <a:bodyPr/>
+                    <a:lstStyle/>
+                    <a:p>
+                      <a:r>
+                        <a:rPr lang="es-ES" sz="1400" dirty="0" err="1"/>
+                        <a:t>User</a:t>
+                      </a:r>
+                      <a:endParaRPr lang="en-GB" sz="1400" dirty="0"/>
+                    </a:p>
+                  </a:txBody>
+                  <a:tcPr/>
+                </a:tc>
+                <a:extLst>
+                  <a:ext uri="{0D108BD9-81ED-4DB2-BD59-A6C34878D82A}">
+                    <a16:rowId xmlns:a16="http://schemas.microsoft.com/office/drawing/2014/main" val="828560084"/>
+                  </a:ext>
+                </a:extLst>
+              </a:tr>
+              <a:tr h="354033">
+                <a:tc>
+                  <a:txBody>
+                    <a:bodyPr/>
+                    <a:lstStyle/>
+                    <a:p>
+                      <a:r>
+                        <a:rPr lang="es-ES" sz="1400" dirty="0"/>
+                        <a:t>ALBERTO</a:t>
+                      </a:r>
+                      <a:endParaRPr lang="en-GB" sz="1400" dirty="0"/>
+                    </a:p>
+                  </a:txBody>
+                  <a:tcPr/>
+                </a:tc>
+                <a:tc>
+                  <a:txBody>
+                    <a:bodyPr/>
+                    <a:lstStyle/>
+                    <a:p>
+                      <a:r>
+                        <a:rPr lang="es-ES" sz="1400" dirty="0"/>
+                        <a:t>Alberto Zeta</a:t>
+                      </a:r>
+                      <a:endParaRPr lang="en-GB" sz="1400" dirty="0"/>
+                    </a:p>
+                  </a:txBody>
+                  <a:tcPr/>
+                </a:tc>
+                <a:tc>
+                  <a:txBody>
+                    <a:bodyPr/>
+                    <a:lstStyle/>
+                    <a:p>
+                      <a:r>
+                        <a:rPr lang="es-ES" sz="1400" dirty="0">
+                          <a:hlinkClick r:id="rId2"/>
+                        </a:rPr>
+                        <a:t>zeta@gmail.com</a:t>
+                      </a:r>
+                      <a:endParaRPr lang="en-GB" sz="1400" dirty="0"/>
+                    </a:p>
+                  </a:txBody>
+                  <a:tcPr/>
+                </a:tc>
+                <a:tc>
+                  <a:txBody>
+                    <a:bodyPr/>
+                    <a:lstStyle/>
+                    <a:p>
+                      <a:r>
+                        <a:rPr lang="es-ES" sz="1400" dirty="0" err="1"/>
+                        <a:t>User</a:t>
+                      </a:r>
+                      <a:endParaRPr lang="en-GB" sz="1400" dirty="0"/>
+                    </a:p>
+                  </a:txBody>
+                  <a:tcPr/>
+                </a:tc>
+                <a:extLst>
+                  <a:ext uri="{0D108BD9-81ED-4DB2-BD59-A6C34878D82A}">
+                    <a16:rowId xmlns:a16="http://schemas.microsoft.com/office/drawing/2014/main" val="1231080118"/>
+                  </a:ext>
+                </a:extLst>
+              </a:tr>
+              <a:tr h="354033">
+                <a:tc>
+                  <a:txBody>
+                    <a:bodyPr/>
+                    <a:lstStyle/>
+                    <a:p>
+                      <a:endParaRPr lang="en-GB" sz="1400" dirty="0"/>
+                    </a:p>
+                  </a:txBody>
+                  <a:tcPr/>
+                </a:tc>
+                <a:tc>
+                  <a:txBody>
+                    <a:bodyPr/>
+                    <a:lstStyle/>
+                    <a:p>
+                      <a:endParaRPr lang="en-GB" sz="1400" dirty="0"/>
+                    </a:p>
+                  </a:txBody>
+                  <a:tcPr/>
+                </a:tc>
+                <a:tc>
+                  <a:txBody>
+                    <a:bodyPr/>
+                    <a:lstStyle/>
+                    <a:p>
+                      <a:endParaRPr lang="en-GB" sz="1400" dirty="0"/>
+                    </a:p>
+                  </a:txBody>
+                  <a:tcPr/>
+                </a:tc>
+                <a:tc>
+                  <a:txBody>
+                    <a:bodyPr/>
+                    <a:lstStyle/>
+                    <a:p>
+                      <a:endParaRPr lang="en-GB" sz="1400" dirty="0"/>
+                    </a:p>
+                  </a:txBody>
+                  <a:tcPr/>
+                </a:tc>
+                <a:extLst>
+                  <a:ext uri="{0D108BD9-81ED-4DB2-BD59-A6C34878D82A}">
+                    <a16:rowId xmlns:a16="http://schemas.microsoft.com/office/drawing/2014/main" val="4143158363"/>
+                  </a:ext>
+                </a:extLst>
+              </a:tr>
+              <a:tr h="354033">
+                <a:tc>
+                  <a:txBody>
+                    <a:bodyPr/>
+                    <a:lstStyle/>
+                    <a:p>
+                      <a:endParaRPr lang="en-GB" sz="1400" dirty="0"/>
+                    </a:p>
+                  </a:txBody>
+                  <a:tcPr/>
+                </a:tc>
+                <a:tc>
+                  <a:txBody>
+                    <a:bodyPr/>
+                    <a:lstStyle/>
+                    <a:p>
+                      <a:endParaRPr lang="en-GB" sz="1400" dirty="0"/>
+                    </a:p>
+                  </a:txBody>
+                  <a:tcPr/>
+                </a:tc>
+                <a:tc>
+                  <a:txBody>
+                    <a:bodyPr/>
+                    <a:lstStyle/>
+                    <a:p>
+                      <a:endParaRPr lang="en-GB" sz="1400" dirty="0"/>
+                    </a:p>
+                  </a:txBody>
+                  <a:tcPr/>
+                </a:tc>
+                <a:tc>
+                  <a:txBody>
+                    <a:bodyPr/>
+                    <a:lstStyle/>
+                    <a:p>
+                      <a:endParaRPr lang="en-GB" sz="1400" dirty="0"/>
+                    </a:p>
+                  </a:txBody>
+                  <a:tcPr/>
+                </a:tc>
+                <a:extLst>
+                  <a:ext uri="{0D108BD9-81ED-4DB2-BD59-A6C34878D82A}">
+                    <a16:rowId xmlns:a16="http://schemas.microsoft.com/office/drawing/2014/main" val="3204891864"/>
+                  </a:ext>
+                </a:extLst>
+              </a:tr>
+              <a:tr h="354033">
+                <a:tc>
+                  <a:txBody>
+                    <a:bodyPr/>
+                    <a:lstStyle/>
+                    <a:p>
+                      <a:endParaRPr lang="en-GB" sz="1400" dirty="0"/>
+                    </a:p>
+                  </a:txBody>
+                  <a:tcPr/>
+                </a:tc>
+                <a:tc>
+                  <a:txBody>
+                    <a:bodyPr/>
+                    <a:lstStyle/>
+                    <a:p>
+                      <a:endParaRPr lang="en-GB" sz="1400" dirty="0"/>
+                    </a:p>
+                  </a:txBody>
+                  <a:tcPr/>
+                </a:tc>
+                <a:tc>
+                  <a:txBody>
+                    <a:bodyPr/>
+                    <a:lstStyle/>
+                    <a:p>
+                      <a:endParaRPr lang="en-GB" sz="1400" dirty="0"/>
+                    </a:p>
+                  </a:txBody>
+                  <a:tcPr/>
+                </a:tc>
+                <a:tc>
+                  <a:txBody>
+                    <a:bodyPr/>
+                    <a:lstStyle/>
+                    <a:p>
+                      <a:endParaRPr lang="en-GB" sz="1400" dirty="0"/>
+                    </a:p>
+                  </a:txBody>
+                  <a:tcPr/>
+                </a:tc>
+                <a:extLst>
+                  <a:ext uri="{0D108BD9-81ED-4DB2-BD59-A6C34878D82A}">
+                    <a16:rowId xmlns:a16="http://schemas.microsoft.com/office/drawing/2014/main" val="2317012103"/>
+                  </a:ext>
+                </a:extLst>
+              </a:tr>
+            </a:tbl>
+          </a:graphicData>
+        </a:graphic>
+      </p:graphicFrame>
+      <p:sp>
+        <p:nvSpPr>
+          <p:cNvPr id="6" name="Rectángulo 5">
+            <a:extLst>
+              <a:ext uri="{FF2B5EF4-FFF2-40B4-BE49-F238E27FC236}">
+                <a16:creationId xmlns:a16="http://schemas.microsoft.com/office/drawing/2014/main" id="{5FF74980-09F8-4262-9792-53390C23E1DD}"/>
+              </a:ext>
+            </a:extLst>
+          </p:cNvPr>
+          <p:cNvSpPr/>
+          <p:nvPr/>
+        </p:nvSpPr>
+        <p:spPr>
+          <a:xfrm>
+            <a:off x="267890" y="390312"/>
+            <a:ext cx="5141318" cy="425329"/>
+          </a:xfrm>
+          <a:prstGeom prst="rect">
+            <a:avLst/>
+          </a:prstGeom>
+        </p:spPr>
+        <p:style>
+          <a:lnRef idx="2">
+            <a:schemeClr val="accent1">
+              <a:shade val="50000"/>
+            </a:schemeClr>
+          </a:lnRef>
+          <a:fillRef idx="1">
+            <a:schemeClr val="accent1"/>
+          </a:fillRef>
+          <a:effectRef idx="0">
+            <a:schemeClr val="accent1"/>
+          </a:effectRef>
+          <a:fontRef idx="minor">
+            <a:schemeClr val="lt1"/>
+          </a:fontRef>
+        </p:style>
+        <p:txBody>
+          <a:bodyPr rtlCol="0" anchor="ctr"/>
+          <a:lstStyle/>
+          <a:p>
+            <a:pPr algn="ctr"/>
+            <a:r>
+              <a:rPr lang="es-ES" dirty="0"/>
+              <a:t>Gestión Usuarios</a:t>
+            </a:r>
+            <a:endParaRPr lang="en-GB" dirty="0"/>
+          </a:p>
+        </p:txBody>
+      </p:sp>
+      <p:sp>
+        <p:nvSpPr>
+          <p:cNvPr id="8" name="Rectángulo 7">
+            <a:extLst>
+              <a:ext uri="{FF2B5EF4-FFF2-40B4-BE49-F238E27FC236}">
+                <a16:creationId xmlns:a16="http://schemas.microsoft.com/office/drawing/2014/main" id="{DC2B9A81-001E-4B97-AB47-39EC471E2EB3}"/>
+              </a:ext>
+            </a:extLst>
+          </p:cNvPr>
+          <p:cNvSpPr/>
+          <p:nvPr/>
+        </p:nvSpPr>
+        <p:spPr>
+          <a:xfrm>
+            <a:off x="5985861" y="435631"/>
+            <a:ext cx="3846907" cy="2533200"/>
+          </a:xfrm>
+          <a:prstGeom prst="rect">
+            <a:avLst/>
+          </a:prstGeom>
+        </p:spPr>
+        <p:style>
+          <a:lnRef idx="1">
+            <a:schemeClr val="accent5"/>
+          </a:lnRef>
+          <a:fillRef idx="2">
+            <a:schemeClr val="accent5"/>
+          </a:fillRef>
+          <a:effectRef idx="1">
+            <a:schemeClr val="accent5"/>
+          </a:effectRef>
+          <a:fontRef idx="minor">
+            <a:schemeClr val="dk1"/>
+          </a:fontRef>
+        </p:style>
+        <p:txBody>
+          <a:bodyPr rtlCol="0" anchor="ctr"/>
+          <a:lstStyle/>
+          <a:p>
+            <a:pPr algn="ctr"/>
+            <a:endParaRPr lang="en-GB"/>
+          </a:p>
+        </p:txBody>
+      </p:sp>
+      <p:sp>
+        <p:nvSpPr>
+          <p:cNvPr id="9" name="Rectángulo 8">
+            <a:extLst>
+              <a:ext uri="{FF2B5EF4-FFF2-40B4-BE49-F238E27FC236}">
+                <a16:creationId xmlns:a16="http://schemas.microsoft.com/office/drawing/2014/main" id="{99B49031-0F3E-460F-B5B0-615B96802661}"/>
+              </a:ext>
+            </a:extLst>
+          </p:cNvPr>
+          <p:cNvSpPr/>
+          <p:nvPr/>
+        </p:nvSpPr>
+        <p:spPr>
+          <a:xfrm>
+            <a:off x="5985862" y="435631"/>
+            <a:ext cx="3846906" cy="425329"/>
+          </a:xfrm>
+          <a:prstGeom prst="rect">
+            <a:avLst/>
+          </a:prstGeom>
+        </p:spPr>
+        <p:style>
+          <a:lnRef idx="2">
+            <a:schemeClr val="accent1">
+              <a:shade val="50000"/>
+            </a:schemeClr>
+          </a:lnRef>
+          <a:fillRef idx="1">
+            <a:schemeClr val="accent1"/>
+          </a:fillRef>
+          <a:effectRef idx="0">
+            <a:schemeClr val="accent1"/>
+          </a:effectRef>
+          <a:fontRef idx="minor">
+            <a:schemeClr val="lt1"/>
+          </a:fontRef>
+        </p:style>
+        <p:txBody>
+          <a:bodyPr rtlCol="0" anchor="ctr"/>
+          <a:lstStyle/>
+          <a:p>
+            <a:pPr algn="ctr"/>
+            <a:r>
+              <a:rPr lang="es-ES" dirty="0"/>
+              <a:t>Inserción/Modificación Usuario</a:t>
+            </a:r>
+            <a:endParaRPr lang="en-GB" dirty="0"/>
+          </a:p>
+        </p:txBody>
+      </p:sp>
+      <p:sp>
+        <p:nvSpPr>
+          <p:cNvPr id="10" name="Rectángulo 9">
+            <a:extLst>
+              <a:ext uri="{FF2B5EF4-FFF2-40B4-BE49-F238E27FC236}">
+                <a16:creationId xmlns:a16="http://schemas.microsoft.com/office/drawing/2014/main" id="{7B0338C4-E7FE-4D05-8727-8F8F007CC575}"/>
+              </a:ext>
+            </a:extLst>
+          </p:cNvPr>
+          <p:cNvSpPr/>
+          <p:nvPr/>
+        </p:nvSpPr>
+        <p:spPr>
+          <a:xfrm>
+            <a:off x="6508028" y="995750"/>
+            <a:ext cx="1080304" cy="273132"/>
+          </a:xfrm>
+          <a:prstGeom prst="rect">
+            <a:avLst/>
+          </a:prstGeom>
+        </p:spPr>
+        <p:style>
+          <a:lnRef idx="2">
+            <a:schemeClr val="accent3">
+              <a:shade val="50000"/>
+            </a:schemeClr>
+          </a:lnRef>
+          <a:fillRef idx="1">
+            <a:schemeClr val="accent3"/>
+          </a:fillRef>
+          <a:effectRef idx="0">
+            <a:schemeClr val="accent3"/>
+          </a:effectRef>
+          <a:fontRef idx="minor">
+            <a:schemeClr val="lt1"/>
+          </a:fontRef>
+        </p:style>
+        <p:txBody>
+          <a:bodyPr rtlCol="0" anchor="ctr"/>
+          <a:lstStyle/>
+          <a:p>
+            <a:pPr algn="ctr"/>
+            <a:r>
+              <a:rPr lang="es-ES" sz="1400" dirty="0">
+                <a:solidFill>
+                  <a:schemeClr val="bg1">
+                    <a:lumMod val="85000"/>
+                  </a:schemeClr>
+                </a:solidFill>
+              </a:rPr>
+              <a:t>ID</a:t>
+            </a:r>
+            <a:endParaRPr lang="en-GB" sz="1400" dirty="0">
+              <a:solidFill>
+                <a:schemeClr val="bg1">
+                  <a:lumMod val="85000"/>
+                </a:schemeClr>
+              </a:solidFill>
+            </a:endParaRPr>
+          </a:p>
+        </p:txBody>
+      </p:sp>
+      <p:sp>
+        <p:nvSpPr>
+          <p:cNvPr id="11" name="Rectángulo 10">
+            <a:extLst>
+              <a:ext uri="{FF2B5EF4-FFF2-40B4-BE49-F238E27FC236}">
+                <a16:creationId xmlns:a16="http://schemas.microsoft.com/office/drawing/2014/main" id="{3FB60F65-C306-4194-A868-D4FB1AF685D5}"/>
+              </a:ext>
+            </a:extLst>
+          </p:cNvPr>
+          <p:cNvSpPr/>
+          <p:nvPr/>
+        </p:nvSpPr>
+        <p:spPr>
+          <a:xfrm>
+            <a:off x="7588332" y="995750"/>
+            <a:ext cx="1662896" cy="273132"/>
+          </a:xfrm>
+          <a:prstGeom prst="rect">
+            <a:avLst/>
+          </a:prstGeom>
+        </p:spPr>
+        <p:style>
+          <a:lnRef idx="2">
+            <a:schemeClr val="accent3">
+              <a:shade val="50000"/>
+            </a:schemeClr>
+          </a:lnRef>
+          <a:fillRef idx="1">
+            <a:schemeClr val="accent3"/>
+          </a:fillRef>
+          <a:effectRef idx="0">
+            <a:schemeClr val="accent3"/>
+          </a:effectRef>
+          <a:fontRef idx="minor">
+            <a:schemeClr val="lt1"/>
+          </a:fontRef>
+        </p:style>
+        <p:txBody>
+          <a:bodyPr rtlCol="0" anchor="ctr"/>
+          <a:lstStyle/>
+          <a:p>
+            <a:pPr algn="ctr"/>
+            <a:r>
+              <a:rPr lang="es-ES" sz="1400" dirty="0" err="1">
+                <a:solidFill>
+                  <a:schemeClr val="bg1">
+                    <a:lumMod val="85000"/>
+                  </a:schemeClr>
+                </a:solidFill>
+              </a:rPr>
+              <a:t>UserName</a:t>
+            </a:r>
+            <a:endParaRPr lang="en-GB" sz="1400" dirty="0">
+              <a:solidFill>
+                <a:schemeClr val="bg1">
+                  <a:lumMod val="85000"/>
+                </a:schemeClr>
+              </a:solidFill>
+            </a:endParaRPr>
+          </a:p>
+        </p:txBody>
+      </p:sp>
+      <p:sp>
+        <p:nvSpPr>
+          <p:cNvPr id="12" name="Rectángulo: esquinas redondeadas 11">
+            <a:extLst>
+              <a:ext uri="{FF2B5EF4-FFF2-40B4-BE49-F238E27FC236}">
+                <a16:creationId xmlns:a16="http://schemas.microsoft.com/office/drawing/2014/main" id="{9206AA93-22B0-43B2-98A7-67AF7AF5E388}"/>
+              </a:ext>
+            </a:extLst>
+          </p:cNvPr>
+          <p:cNvSpPr/>
+          <p:nvPr/>
+        </p:nvSpPr>
+        <p:spPr>
+          <a:xfrm>
+            <a:off x="6291303" y="2307376"/>
+            <a:ext cx="1371600" cy="385948"/>
+          </a:xfrm>
+          <a:prstGeom prst="roundRect">
+            <a:avLst/>
+          </a:prstGeom>
+        </p:spPr>
+        <p:style>
+          <a:lnRef idx="0">
+            <a:schemeClr val="accent5"/>
+          </a:lnRef>
+          <a:fillRef idx="3">
+            <a:schemeClr val="accent5"/>
+          </a:fillRef>
+          <a:effectRef idx="3">
+            <a:schemeClr val="accent5"/>
+          </a:effectRef>
+          <a:fontRef idx="minor">
+            <a:schemeClr val="lt1"/>
+          </a:fontRef>
+        </p:style>
+        <p:txBody>
+          <a:bodyPr rtlCol="0" anchor="ctr"/>
+          <a:lstStyle/>
+          <a:p>
+            <a:pPr algn="ctr"/>
+            <a:r>
+              <a:rPr lang="es-ES" dirty="0"/>
+              <a:t>Grabar</a:t>
+            </a:r>
+            <a:endParaRPr lang="en-GB" dirty="0"/>
+          </a:p>
+        </p:txBody>
+      </p:sp>
+      <p:sp>
+        <p:nvSpPr>
+          <p:cNvPr id="13" name="Rectángulo 12">
+            <a:extLst>
+              <a:ext uri="{FF2B5EF4-FFF2-40B4-BE49-F238E27FC236}">
+                <a16:creationId xmlns:a16="http://schemas.microsoft.com/office/drawing/2014/main" id="{1B8A95E9-9E38-472F-895F-245D6BA03A6F}"/>
+              </a:ext>
+            </a:extLst>
+          </p:cNvPr>
+          <p:cNvSpPr/>
+          <p:nvPr/>
+        </p:nvSpPr>
+        <p:spPr>
+          <a:xfrm>
+            <a:off x="6508026" y="1268882"/>
+            <a:ext cx="2743201" cy="273132"/>
+          </a:xfrm>
+          <a:prstGeom prst="rect">
+            <a:avLst/>
+          </a:prstGeom>
+        </p:spPr>
+        <p:style>
+          <a:lnRef idx="2">
+            <a:schemeClr val="accent3">
+              <a:shade val="50000"/>
+            </a:schemeClr>
+          </a:lnRef>
+          <a:fillRef idx="1">
+            <a:schemeClr val="accent3"/>
+          </a:fillRef>
+          <a:effectRef idx="0">
+            <a:schemeClr val="accent3"/>
+          </a:effectRef>
+          <a:fontRef idx="minor">
+            <a:schemeClr val="lt1"/>
+          </a:fontRef>
+        </p:style>
+        <p:txBody>
+          <a:bodyPr rtlCol="0" anchor="ctr"/>
+          <a:lstStyle/>
+          <a:p>
+            <a:pPr algn="ctr"/>
+            <a:r>
+              <a:rPr lang="es-ES" sz="1400" dirty="0">
+                <a:solidFill>
+                  <a:schemeClr val="bg1">
+                    <a:lumMod val="85000"/>
+                  </a:schemeClr>
+                </a:solidFill>
+              </a:rPr>
+              <a:t>Nombre completo</a:t>
+            </a:r>
+            <a:endParaRPr lang="en-GB" sz="1400" dirty="0">
+              <a:solidFill>
+                <a:schemeClr val="bg1">
+                  <a:lumMod val="85000"/>
+                </a:schemeClr>
+              </a:solidFill>
+            </a:endParaRPr>
+          </a:p>
+        </p:txBody>
+      </p:sp>
+      <p:sp>
+        <p:nvSpPr>
+          <p:cNvPr id="14" name="Rectángulo 13">
+            <a:extLst>
+              <a:ext uri="{FF2B5EF4-FFF2-40B4-BE49-F238E27FC236}">
+                <a16:creationId xmlns:a16="http://schemas.microsoft.com/office/drawing/2014/main" id="{DBBB54A0-C469-4163-8260-B34D888CE554}"/>
+              </a:ext>
+            </a:extLst>
+          </p:cNvPr>
+          <p:cNvSpPr/>
+          <p:nvPr/>
+        </p:nvSpPr>
+        <p:spPr>
+          <a:xfrm>
+            <a:off x="6508028" y="1542014"/>
+            <a:ext cx="1080304" cy="273132"/>
+          </a:xfrm>
+          <a:prstGeom prst="rect">
+            <a:avLst/>
+          </a:prstGeom>
+        </p:spPr>
+        <p:style>
+          <a:lnRef idx="2">
+            <a:schemeClr val="accent3">
+              <a:shade val="50000"/>
+            </a:schemeClr>
+          </a:lnRef>
+          <a:fillRef idx="1">
+            <a:schemeClr val="accent3"/>
+          </a:fillRef>
+          <a:effectRef idx="0">
+            <a:schemeClr val="accent3"/>
+          </a:effectRef>
+          <a:fontRef idx="minor">
+            <a:schemeClr val="lt1"/>
+          </a:fontRef>
+        </p:style>
+        <p:txBody>
+          <a:bodyPr rtlCol="0" anchor="ctr"/>
+          <a:lstStyle/>
+          <a:p>
+            <a:pPr algn="ctr"/>
+            <a:r>
+              <a:rPr lang="es-ES" sz="1400" dirty="0">
+                <a:solidFill>
+                  <a:schemeClr val="bg1">
+                    <a:lumMod val="85000"/>
+                  </a:schemeClr>
+                </a:solidFill>
+              </a:rPr>
+              <a:t>Perfil      </a:t>
+            </a:r>
+            <a:endParaRPr lang="en-GB" sz="1400" dirty="0">
+              <a:solidFill>
+                <a:schemeClr val="bg1">
+                  <a:lumMod val="85000"/>
+                </a:schemeClr>
+              </a:solidFill>
+            </a:endParaRPr>
+          </a:p>
+        </p:txBody>
+      </p:sp>
+      <p:sp>
+        <p:nvSpPr>
+          <p:cNvPr id="15" name="Rectángulo 14">
+            <a:extLst>
+              <a:ext uri="{FF2B5EF4-FFF2-40B4-BE49-F238E27FC236}">
+                <a16:creationId xmlns:a16="http://schemas.microsoft.com/office/drawing/2014/main" id="{F1B2CDCC-31E6-4EED-98B9-6074717725E9}"/>
+              </a:ext>
+            </a:extLst>
+          </p:cNvPr>
+          <p:cNvSpPr/>
+          <p:nvPr/>
+        </p:nvSpPr>
+        <p:spPr>
+          <a:xfrm>
+            <a:off x="7588332" y="1542014"/>
+            <a:ext cx="1662896" cy="273132"/>
+          </a:xfrm>
+          <a:prstGeom prst="rect">
+            <a:avLst/>
+          </a:prstGeom>
+        </p:spPr>
+        <p:style>
+          <a:lnRef idx="2">
+            <a:schemeClr val="accent3">
+              <a:shade val="50000"/>
+            </a:schemeClr>
+          </a:lnRef>
+          <a:fillRef idx="1">
+            <a:schemeClr val="accent3"/>
+          </a:fillRef>
+          <a:effectRef idx="0">
+            <a:schemeClr val="accent3"/>
+          </a:effectRef>
+          <a:fontRef idx="minor">
+            <a:schemeClr val="lt1"/>
+          </a:fontRef>
+        </p:style>
+        <p:txBody>
+          <a:bodyPr rtlCol="0" anchor="ctr"/>
+          <a:lstStyle/>
+          <a:p>
+            <a:pPr algn="ctr"/>
+            <a:r>
+              <a:rPr lang="es-ES" sz="1400" dirty="0">
+                <a:solidFill>
+                  <a:schemeClr val="bg1">
+                    <a:lumMod val="85000"/>
+                  </a:schemeClr>
+                </a:solidFill>
+              </a:rPr>
+              <a:t>Email</a:t>
+            </a:r>
+            <a:endParaRPr lang="en-GB" sz="1400" dirty="0">
+              <a:solidFill>
+                <a:schemeClr val="bg1">
+                  <a:lumMod val="85000"/>
+                </a:schemeClr>
+              </a:solidFill>
+            </a:endParaRPr>
+          </a:p>
+        </p:txBody>
+      </p:sp>
+      <p:pic>
+        <p:nvPicPr>
+          <p:cNvPr id="16" name="Gráfico 15" descr="Reproducir con relleno sólido">
+            <a:extLst>
+              <a:ext uri="{FF2B5EF4-FFF2-40B4-BE49-F238E27FC236}">
+                <a16:creationId xmlns:a16="http://schemas.microsoft.com/office/drawing/2014/main" id="{AF600331-58EC-4CB3-A9C1-C8FDA603A30C}"/>
+              </a:ext>
+            </a:extLst>
+          </p:cNvPr>
+          <p:cNvPicPr>
+            <a:picLocks noChangeAspect="1"/>
+          </p:cNvPicPr>
+          <p:nvPr/>
+        </p:nvPicPr>
+        <p:blipFill>
+          <a:blip r:embed="rId3">
+            <a:extLst>
+              <a:ext uri="{28A0092B-C50C-407E-A947-70E740481C1C}">
+                <a14:useLocalDpi xmlns:a14="http://schemas.microsoft.com/office/drawing/2010/main" val="0"/>
+              </a:ext>
+              <a:ext uri="{96DAC541-7B7A-43D3-8B79-37D633B846F1}">
+                <asvg:svgBlip xmlns:asvg="http://schemas.microsoft.com/office/drawing/2016/SVG/main" r:embed="rId4"/>
+              </a:ext>
+            </a:extLst>
+          </a:blip>
+          <a:stretch>
+            <a:fillRect/>
+          </a:stretch>
+        </p:blipFill>
+        <p:spPr>
+          <a:xfrm rot="5400000">
+            <a:off x="7329259" y="1565477"/>
+            <a:ext cx="259073" cy="259073"/>
+          </a:xfrm>
+          <a:prstGeom prst="rect">
+            <a:avLst/>
+          </a:prstGeom>
+        </p:spPr>
+      </p:pic>
+      <p:sp>
+        <p:nvSpPr>
+          <p:cNvPr id="17" name="Rectángulo 16">
+            <a:extLst>
+              <a:ext uri="{FF2B5EF4-FFF2-40B4-BE49-F238E27FC236}">
+                <a16:creationId xmlns:a16="http://schemas.microsoft.com/office/drawing/2014/main" id="{98A90147-D7B0-48E9-964A-73A3CA8E8FB4}"/>
+              </a:ext>
+            </a:extLst>
+          </p:cNvPr>
+          <p:cNvSpPr/>
+          <p:nvPr/>
+        </p:nvSpPr>
+        <p:spPr>
+          <a:xfrm>
+            <a:off x="6508027" y="1806985"/>
+            <a:ext cx="1080304" cy="273132"/>
+          </a:xfrm>
+          <a:prstGeom prst="rect">
+            <a:avLst/>
+          </a:prstGeom>
+        </p:spPr>
+        <p:style>
+          <a:lnRef idx="2">
+            <a:schemeClr val="accent3">
+              <a:shade val="50000"/>
+            </a:schemeClr>
+          </a:lnRef>
+          <a:fillRef idx="1">
+            <a:schemeClr val="accent3"/>
+          </a:fillRef>
+          <a:effectRef idx="0">
+            <a:schemeClr val="accent3"/>
+          </a:effectRef>
+          <a:fontRef idx="minor">
+            <a:schemeClr val="lt1"/>
+          </a:fontRef>
+        </p:style>
+        <p:txBody>
+          <a:bodyPr rtlCol="0" anchor="ctr"/>
+          <a:lstStyle/>
+          <a:p>
+            <a:pPr algn="ctr"/>
+            <a:r>
+              <a:rPr lang="es-ES" sz="1400" dirty="0">
+                <a:solidFill>
+                  <a:schemeClr val="bg1">
+                    <a:lumMod val="85000"/>
+                  </a:schemeClr>
+                </a:solidFill>
+              </a:rPr>
+              <a:t>Baja</a:t>
+            </a:r>
+            <a:endParaRPr lang="en-GB" sz="1400" dirty="0">
+              <a:solidFill>
+                <a:schemeClr val="bg1">
+                  <a:lumMod val="85000"/>
+                </a:schemeClr>
+              </a:solidFill>
+            </a:endParaRPr>
+          </a:p>
+        </p:txBody>
+      </p:sp>
+      <p:sp>
+        <p:nvSpPr>
+          <p:cNvPr id="18" name="Rectángulo 17">
+            <a:extLst>
+              <a:ext uri="{FF2B5EF4-FFF2-40B4-BE49-F238E27FC236}">
+                <a16:creationId xmlns:a16="http://schemas.microsoft.com/office/drawing/2014/main" id="{96B56D56-A385-49E9-B2CE-A388F670C472}"/>
+              </a:ext>
+            </a:extLst>
+          </p:cNvPr>
+          <p:cNvSpPr/>
+          <p:nvPr/>
+        </p:nvSpPr>
+        <p:spPr>
+          <a:xfrm>
+            <a:off x="7588331" y="1806985"/>
+            <a:ext cx="1662896" cy="273132"/>
+          </a:xfrm>
+          <a:prstGeom prst="rect">
+            <a:avLst/>
+          </a:prstGeom>
+        </p:spPr>
+        <p:style>
+          <a:lnRef idx="2">
+            <a:schemeClr val="accent3">
+              <a:shade val="50000"/>
+            </a:schemeClr>
+          </a:lnRef>
+          <a:fillRef idx="1">
+            <a:schemeClr val="accent3"/>
+          </a:fillRef>
+          <a:effectRef idx="0">
+            <a:schemeClr val="accent3"/>
+          </a:effectRef>
+          <a:fontRef idx="minor">
+            <a:schemeClr val="lt1"/>
+          </a:fontRef>
+        </p:style>
+        <p:txBody>
+          <a:bodyPr rtlCol="0" anchor="ctr"/>
+          <a:lstStyle/>
+          <a:p>
+            <a:pPr algn="ctr"/>
+            <a:r>
+              <a:rPr lang="es-ES" sz="1400" dirty="0" err="1">
+                <a:solidFill>
+                  <a:schemeClr val="bg1">
+                    <a:lumMod val="85000"/>
+                  </a:schemeClr>
+                </a:solidFill>
+              </a:rPr>
+              <a:t>Password</a:t>
+            </a:r>
+            <a:endParaRPr lang="en-GB" sz="1400" dirty="0">
+              <a:solidFill>
+                <a:schemeClr val="bg1">
+                  <a:lumMod val="85000"/>
+                </a:schemeClr>
+              </a:solidFill>
+            </a:endParaRPr>
+          </a:p>
+        </p:txBody>
+      </p:sp>
+      <p:pic>
+        <p:nvPicPr>
+          <p:cNvPr id="19" name="Gráfico 18" descr="Reproducir con relleno sólido">
+            <a:extLst>
+              <a:ext uri="{FF2B5EF4-FFF2-40B4-BE49-F238E27FC236}">
+                <a16:creationId xmlns:a16="http://schemas.microsoft.com/office/drawing/2014/main" id="{250DC5A2-4D58-409E-9E9C-28F2448D646D}"/>
+              </a:ext>
+            </a:extLst>
+          </p:cNvPr>
+          <p:cNvPicPr>
+            <a:picLocks noChangeAspect="1"/>
+          </p:cNvPicPr>
+          <p:nvPr/>
+        </p:nvPicPr>
+        <p:blipFill>
+          <a:blip r:embed="rId3">
+            <a:extLst>
+              <a:ext uri="{28A0092B-C50C-407E-A947-70E740481C1C}">
+                <a14:useLocalDpi xmlns:a14="http://schemas.microsoft.com/office/drawing/2010/main" val="0"/>
+              </a:ext>
+              <a:ext uri="{96DAC541-7B7A-43D3-8B79-37D633B846F1}">
+                <asvg:svgBlip xmlns:asvg="http://schemas.microsoft.com/office/drawing/2016/SVG/main" r:embed="rId4"/>
+              </a:ext>
+            </a:extLst>
+          </a:blip>
+          <a:stretch>
+            <a:fillRect/>
+          </a:stretch>
+        </p:blipFill>
+        <p:spPr>
+          <a:xfrm rot="5400000">
+            <a:off x="7329257" y="1823202"/>
+            <a:ext cx="259073" cy="259073"/>
+          </a:xfrm>
+          <a:prstGeom prst="rect">
+            <a:avLst/>
+          </a:prstGeom>
+        </p:spPr>
+      </p:pic>
+      <p:sp>
+        <p:nvSpPr>
+          <p:cNvPr id="20" name="Rectángulo: esquinas redondeadas 19">
+            <a:extLst>
+              <a:ext uri="{FF2B5EF4-FFF2-40B4-BE49-F238E27FC236}">
+                <a16:creationId xmlns:a16="http://schemas.microsoft.com/office/drawing/2014/main" id="{A178D142-A441-49C8-9C9E-E07A0651A513}"/>
+              </a:ext>
+            </a:extLst>
+          </p:cNvPr>
+          <p:cNvSpPr/>
+          <p:nvPr/>
+        </p:nvSpPr>
+        <p:spPr>
+          <a:xfrm>
+            <a:off x="7968345" y="2307376"/>
+            <a:ext cx="1371600" cy="385948"/>
+          </a:xfrm>
+          <a:prstGeom prst="roundRect">
+            <a:avLst/>
+          </a:prstGeom>
+        </p:spPr>
+        <p:style>
+          <a:lnRef idx="0">
+            <a:schemeClr val="accent5"/>
+          </a:lnRef>
+          <a:fillRef idx="3">
+            <a:schemeClr val="accent5"/>
+          </a:fillRef>
+          <a:effectRef idx="3">
+            <a:schemeClr val="accent5"/>
+          </a:effectRef>
+          <a:fontRef idx="minor">
+            <a:schemeClr val="lt1"/>
+          </a:fontRef>
+        </p:style>
+        <p:txBody>
+          <a:bodyPr rtlCol="0" anchor="ctr"/>
+          <a:lstStyle/>
+          <a:p>
+            <a:pPr algn="ctr"/>
+            <a:r>
+              <a:rPr lang="es-ES" dirty="0"/>
+              <a:t>Cancelar</a:t>
+            </a:r>
+            <a:endParaRPr lang="en-GB" dirty="0"/>
+          </a:p>
+        </p:txBody>
+      </p:sp>
+    </p:spTree>
+    <p:extLst>
+      <p:ext uri="{BB962C8B-B14F-4D97-AF65-F5344CB8AC3E}">
+        <p14:creationId xmlns:p14="http://schemas.microsoft.com/office/powerpoint/2010/main" val="1168382725"/>
+      </p:ext>
+    </p:extLst>
+  </p:cSld>
+  <p:clrMapOvr>
+    <a:masterClrMapping/>
+  </p:clrMapOvr>
+</p:sld>
+</file>
+
 <file path=ppt/theme/theme1.xml><?xml version="1.0" encoding="utf-8"?>
 <a:theme xmlns:a="http://schemas.openxmlformats.org/drawingml/2006/main" name="Tema de Office">
   <a:themeElements>

</xml_diff>